<commit_message>
Added text to Security buttons + highlight feature. Made task guy actually readable (Don't know what happened was supposed to commit...)
so comitted again
</commit_message>
<xml_diff>
--- a/BYOI-webClient-v1/images/images.pptx
+++ b/BYOI-webClient-v1/images/images.pptx
@@ -244,7 +244,7 @@
           <a:p>
             <a:fld id="{30D1584E-7273-4D3B-A72C-CEA3D21265DB}" type="datetimeFigureOut">
               <a:rPr lang="en-GB" smtClean="0"/>
-              <a:t>02/03/2016</a:t>
+              <a:t>13/03/2016</a:t>
             </a:fld>
             <a:endParaRPr lang="en-GB"/>
           </a:p>
@@ -414,7 +414,7 @@
           <a:p>
             <a:fld id="{30D1584E-7273-4D3B-A72C-CEA3D21265DB}" type="datetimeFigureOut">
               <a:rPr lang="en-GB" smtClean="0"/>
-              <a:t>02/03/2016</a:t>
+              <a:t>13/03/2016</a:t>
             </a:fld>
             <a:endParaRPr lang="en-GB"/>
           </a:p>
@@ -594,7 +594,7 @@
           <a:p>
             <a:fld id="{30D1584E-7273-4D3B-A72C-CEA3D21265DB}" type="datetimeFigureOut">
               <a:rPr lang="en-GB" smtClean="0"/>
-              <a:t>02/03/2016</a:t>
+              <a:t>13/03/2016</a:t>
             </a:fld>
             <a:endParaRPr lang="en-GB"/>
           </a:p>
@@ -764,7 +764,7 @@
           <a:p>
             <a:fld id="{30D1584E-7273-4D3B-A72C-CEA3D21265DB}" type="datetimeFigureOut">
               <a:rPr lang="en-GB" smtClean="0"/>
-              <a:t>02/03/2016</a:t>
+              <a:t>13/03/2016</a:t>
             </a:fld>
             <a:endParaRPr lang="en-GB"/>
           </a:p>
@@ -1010,7 +1010,7 @@
           <a:p>
             <a:fld id="{30D1584E-7273-4D3B-A72C-CEA3D21265DB}" type="datetimeFigureOut">
               <a:rPr lang="en-GB" smtClean="0"/>
-              <a:t>02/03/2016</a:t>
+              <a:t>13/03/2016</a:t>
             </a:fld>
             <a:endParaRPr lang="en-GB"/>
           </a:p>
@@ -1242,7 +1242,7 @@
           <a:p>
             <a:fld id="{30D1584E-7273-4D3B-A72C-CEA3D21265DB}" type="datetimeFigureOut">
               <a:rPr lang="en-GB" smtClean="0"/>
-              <a:t>02/03/2016</a:t>
+              <a:t>13/03/2016</a:t>
             </a:fld>
             <a:endParaRPr lang="en-GB"/>
           </a:p>
@@ -1609,7 +1609,7 @@
           <a:p>
             <a:fld id="{30D1584E-7273-4D3B-A72C-CEA3D21265DB}" type="datetimeFigureOut">
               <a:rPr lang="en-GB" smtClean="0"/>
-              <a:t>02/03/2016</a:t>
+              <a:t>13/03/2016</a:t>
             </a:fld>
             <a:endParaRPr lang="en-GB"/>
           </a:p>
@@ -1727,7 +1727,7 @@
           <a:p>
             <a:fld id="{30D1584E-7273-4D3B-A72C-CEA3D21265DB}" type="datetimeFigureOut">
               <a:rPr lang="en-GB" smtClean="0"/>
-              <a:t>02/03/2016</a:t>
+              <a:t>13/03/2016</a:t>
             </a:fld>
             <a:endParaRPr lang="en-GB"/>
           </a:p>
@@ -1822,7 +1822,7 @@
           <a:p>
             <a:fld id="{30D1584E-7273-4D3B-A72C-CEA3D21265DB}" type="datetimeFigureOut">
               <a:rPr lang="en-GB" smtClean="0"/>
-              <a:t>02/03/2016</a:t>
+              <a:t>13/03/2016</a:t>
             </a:fld>
             <a:endParaRPr lang="en-GB"/>
           </a:p>
@@ -2099,7 +2099,7 @@
           <a:p>
             <a:fld id="{30D1584E-7273-4D3B-A72C-CEA3D21265DB}" type="datetimeFigureOut">
               <a:rPr lang="en-GB" smtClean="0"/>
-              <a:t>02/03/2016</a:t>
+              <a:t>13/03/2016</a:t>
             </a:fld>
             <a:endParaRPr lang="en-GB"/>
           </a:p>
@@ -2352,7 +2352,7 @@
           <a:p>
             <a:fld id="{30D1584E-7273-4D3B-A72C-CEA3D21265DB}" type="datetimeFigureOut">
               <a:rPr lang="en-GB" smtClean="0"/>
-              <a:t>02/03/2016</a:t>
+              <a:t>13/03/2016</a:t>
             </a:fld>
             <a:endParaRPr lang="en-GB"/>
           </a:p>
@@ -2565,7 +2565,7 @@
           <a:p>
             <a:fld id="{30D1584E-7273-4D3B-A72C-CEA3D21265DB}" type="datetimeFigureOut">
               <a:rPr lang="en-GB" smtClean="0"/>
-              <a:t>02/03/2016</a:t>
+              <a:t>13/03/2016</a:t>
             </a:fld>
             <a:endParaRPr lang="en-GB"/>
           </a:p>
@@ -4102,6 +4102,47 @@
           <a:xfrm>
             <a:off x="-123825" y="215899"/>
             <a:ext cx="7181850" cy="2133601"/>
+          </a:xfrm>
+          <a:prstGeom prst="rect">
+            <a:avLst/>
+          </a:prstGeom>
+          <a:noFill/>
+          <a:extLst>
+            <a:ext uri="{909E8E84-426E-40DD-AFC4-6F175D3DCCD1}">
+              <a14:hiddenFill xmlns:a14="http://schemas.microsoft.com/office/drawing/2010/main">
+                <a:solidFill>
+                  <a:srgbClr val="FFFFFF"/>
+                </a:solidFill>
+              </a14:hiddenFill>
+            </a:ext>
+          </a:extLst>
+        </p:spPr>
+      </p:pic>
+      <p:pic>
+        <p:nvPicPr>
+          <p:cNvPr id="1026" name="Picture 2" descr="Screen Shot 2016-02-08 at 23.01.16.png"/>
+          <p:cNvPicPr>
+            <a:picLocks noChangeAspect="1" noChangeArrowheads="1"/>
+          </p:cNvPicPr>
+          <p:nvPr/>
+        </p:nvPicPr>
+        <p:blipFill>
+          <a:blip r:embed="rId12">
+            <a:extLst>
+              <a:ext uri="{28A0092B-C50C-407E-A947-70E740481C1C}">
+                <a14:useLocalDpi xmlns:a14="http://schemas.microsoft.com/office/drawing/2010/main" val="0"/>
+              </a:ext>
+            </a:extLst>
+          </a:blip>
+          <a:srcRect/>
+          <a:stretch>
+            <a:fillRect/>
+          </a:stretch>
+        </p:blipFill>
+        <p:spPr bwMode="auto">
+          <a:xfrm>
+            <a:off x="155575" y="-1195388"/>
+            <a:ext cx="2628900" cy="2971801"/>
           </a:xfrm>
           <a:prstGeom prst="rect">
             <a:avLst/>

</xml_diff>